<commit_message>
Cambios menores en la presentación.
</commit_message>
<xml_diff>
--- a/presentacion.pptx
+++ b/presentacion.pptx
@@ -3236,6 +3236,13 @@
   <p:clrMapOvr>
     <a:masterClrMapping/>
   </p:clrMapOvr>
+  <p:timing>
+    <p:tnLst>
+      <p:par>
+        <p:cTn xmlns:p14="http://schemas.microsoft.com/office/powerpoint/2010/main" id="1" dur="indefinite" restart="never" nodeType="tmRoot"/>
+      </p:par>
+    </p:tnLst>
+  </p:timing>
 </p:sld>
 </file>
 
@@ -3726,6 +3733,13 @@
   <p:clrMapOvr>
     <a:masterClrMapping/>
   </p:clrMapOvr>
+  <p:timing>
+    <p:tnLst>
+      <p:par>
+        <p:cTn xmlns:p14="http://schemas.microsoft.com/office/powerpoint/2010/main" id="1" dur="indefinite" restart="never" nodeType="tmRoot"/>
+      </p:par>
+    </p:tnLst>
+  </p:timing>
 </p:sld>
 </file>
 
@@ -4050,6 +4064,13 @@
   <p:clrMapOvr>
     <a:masterClrMapping/>
   </p:clrMapOvr>
+  <p:timing>
+    <p:tnLst>
+      <p:par>
+        <p:cTn xmlns:p14="http://schemas.microsoft.com/office/powerpoint/2010/main" id="1" dur="indefinite" restart="never" nodeType="tmRoot"/>
+      </p:par>
+    </p:tnLst>
+  </p:timing>
 </p:sld>
 </file>
 
@@ -4229,8 +4250,12 @@
           </a:p>
           <a:p>
             <a:r>
-              <a:rPr lang="en-US" dirty="0" smtClean="0"/>
-              <a:t>No </a:t>
+              <a:rPr lang="en-US" dirty="0" err="1" smtClean="0"/>
+              <a:t>Nos</a:t>
+            </a:r>
+            <a:r>
+              <a:rPr lang="en-US" dirty="0" smtClean="0"/>
+              <a:t> </a:t>
             </a:r>
             <a:r>
               <a:rPr lang="en-US" dirty="0" err="1" smtClean="0"/>
@@ -4714,6 +4739,13 @@
   <p:clrMapOvr>
     <a:masterClrMapping/>
   </p:clrMapOvr>
+  <p:timing>
+    <p:tnLst>
+      <p:par>
+        <p:cTn xmlns:p14="http://schemas.microsoft.com/office/powerpoint/2010/main" id="1" dur="indefinite" restart="never" nodeType="tmRoot"/>
+      </p:par>
+    </p:tnLst>
+  </p:timing>
 </p:sld>
 </file>
 
@@ -5085,6 +5117,13 @@
   <p:clrMapOvr>
     <a:masterClrMapping/>
   </p:clrMapOvr>
+  <p:timing>
+    <p:tnLst>
+      <p:par>
+        <p:cTn xmlns:p14="http://schemas.microsoft.com/office/powerpoint/2010/main" id="1" dur="indefinite" restart="never" nodeType="tmRoot"/>
+      </p:par>
+    </p:tnLst>
+  </p:timing>
 </p:sld>
 </file>
 
@@ -6205,6 +6244,13 @@
   <p:clrMapOvr>
     <a:masterClrMapping/>
   </p:clrMapOvr>
+  <p:timing>
+    <p:tnLst>
+      <p:par>
+        <p:cTn xmlns:p14="http://schemas.microsoft.com/office/powerpoint/2010/main" id="1" dur="indefinite" restart="never" nodeType="tmRoot"/>
+      </p:par>
+    </p:tnLst>
+  </p:timing>
 </p:sld>
 </file>
 
@@ -6550,6 +6596,13 @@
   <p:clrMapOvr>
     <a:masterClrMapping/>
   </p:clrMapOvr>
+  <p:timing>
+    <p:tnLst>
+      <p:par>
+        <p:cTn xmlns:p14="http://schemas.microsoft.com/office/powerpoint/2010/main" id="1" dur="indefinite" restart="never" nodeType="tmRoot"/>
+      </p:par>
+    </p:tnLst>
+  </p:timing>
 </p:sld>
 </file>
 
@@ -6872,6 +6925,13 @@
   <p:clrMapOvr>
     <a:masterClrMapping/>
   </p:clrMapOvr>
+  <p:timing>
+    <p:tnLst>
+      <p:par>
+        <p:cTn xmlns:p14="http://schemas.microsoft.com/office/powerpoint/2010/main" id="1" dur="indefinite" restart="never" nodeType="tmRoot"/>
+      </p:par>
+    </p:tnLst>
+  </p:timing>
 </p:sld>
 </file>
 
@@ -7186,6 +7246,13 @@
   <p:clrMapOvr>
     <a:masterClrMapping/>
   </p:clrMapOvr>
+  <p:timing>
+    <p:tnLst>
+      <p:par>
+        <p:cTn xmlns:p14="http://schemas.microsoft.com/office/powerpoint/2010/main" id="1" dur="indefinite" restart="never" nodeType="tmRoot"/>
+      </p:par>
+    </p:tnLst>
+  </p:timing>
 </p:sld>
 </file>
 
@@ -7428,6 +7495,13 @@
   <p:clrMapOvr>
     <a:masterClrMapping/>
   </p:clrMapOvr>
+  <p:timing>
+    <p:tnLst>
+      <p:par>
+        <p:cTn xmlns:p14="http://schemas.microsoft.com/office/powerpoint/2010/main" id="1" dur="indefinite" restart="never" nodeType="tmRoot"/>
+      </p:par>
+    </p:tnLst>
+  </p:timing>
 </p:sld>
 </file>
 
@@ -7655,6 +7729,13 @@
   <p:clrMapOvr>
     <a:masterClrMapping/>
   </p:clrMapOvr>
+  <p:timing>
+    <p:tnLst>
+      <p:par>
+        <p:cTn xmlns:p14="http://schemas.microsoft.com/office/powerpoint/2010/main" id="1" dur="indefinite" restart="never" nodeType="tmRoot"/>
+      </p:par>
+    </p:tnLst>
+  </p:timing>
 </p:sld>
 </file>
 
@@ -7870,16 +7951,12 @@
           </a:p>
           <a:p>
             <a:r>
-              <a:rPr lang="en-US" u="sng" dirty="0" err="1" smtClean="0"/>
+              <a:rPr lang="en-US" dirty="0" err="1" smtClean="0"/>
               <a:t>Controlador</a:t>
             </a:r>
             <a:r>
-              <a:rPr lang="en-US" u="sng" dirty="0" smtClean="0"/>
-              <a:t>: </a:t>
-            </a:r>
-            <a:r>
-              <a:rPr lang="en-US" dirty="0" err="1" smtClean="0"/>
-              <a:t>clases</a:t>
+              <a:rPr lang="en-US" smtClean="0"/>
+              <a:t>: clases</a:t>
             </a:r>
             <a:r>
               <a:rPr lang="en-US" dirty="0" smtClean="0"/>
@@ -7991,6 +8068,13 @@
   <p:clrMapOvr>
     <a:masterClrMapping/>
   </p:clrMapOvr>
+  <p:timing>
+    <p:tnLst>
+      <p:par>
+        <p:cTn xmlns:p14="http://schemas.microsoft.com/office/powerpoint/2010/main" id="1" dur="indefinite" restart="never" nodeType="tmRoot"/>
+      </p:par>
+    </p:tnLst>
+  </p:timing>
 </p:sld>
 </file>
 
@@ -8203,6 +8287,13 @@
   <p:clrMapOvr>
     <a:masterClrMapping/>
   </p:clrMapOvr>
+  <p:timing>
+    <p:tnLst>
+      <p:par>
+        <p:cTn xmlns:p14="http://schemas.microsoft.com/office/powerpoint/2010/main" id="1" dur="indefinite" restart="never" nodeType="tmRoot"/>
+      </p:par>
+    </p:tnLst>
+  </p:timing>
 </p:sld>
 </file>
 
@@ -8601,6 +8692,13 @@
   <p:clrMapOvr>
     <a:masterClrMapping/>
   </p:clrMapOvr>
+  <p:timing>
+    <p:tnLst>
+      <p:par>
+        <p:cTn xmlns:p14="http://schemas.microsoft.com/office/powerpoint/2010/main" id="1" dur="indefinite" restart="never" nodeType="tmRoot"/>
+      </p:par>
+    </p:tnLst>
+  </p:timing>
 </p:sld>
 </file>
 
@@ -8693,6 +8791,13 @@
   <p:clrMapOvr>
     <a:masterClrMapping/>
   </p:clrMapOvr>
+  <p:timing>
+    <p:tnLst>
+      <p:par>
+        <p:cTn xmlns:p14="http://schemas.microsoft.com/office/powerpoint/2010/main" id="1" dur="indefinite" restart="never" nodeType="tmRoot"/>
+      </p:par>
+    </p:tnLst>
+  </p:timing>
 </p:sld>
 </file>
 

</xml_diff>